<commit_message>
T9_Group ViewNode 구조로 처리
</commit_message>
<xml_diff>
--- a/DsDotNet/src/UnitTest/UnitTest.Engine/ImportPPT/T9_Group.pptx
+++ b/DsDotNet/src/UnitTest/UnitTest.Engine/ImportPPT/T9_Group.pptx
@@ -9874,65 +9874,12 @@
           </a:p>
         </p:txBody>
       </p:sp>
-      <p:sp>
-        <p:nvSpPr>
-          <p:cNvPr id="57" name="TextBox 56">
-            <a:extLst>
-              <a:ext uri="{FF2B5EF4-FFF2-40B4-BE49-F238E27FC236}">
-                <a16:creationId xmlns:a16="http://schemas.microsoft.com/office/drawing/2014/main" id="{86C0DB17-5983-5AB1-2A10-EF20E8B13F5C}"/>
-              </a:ext>
-            </a:extLst>
-          </p:cNvPr>
-          <p:cNvSpPr txBox="1"/>
-          <p:nvPr/>
-        </p:nvSpPr>
-        <p:spPr>
-          <a:xfrm>
-            <a:off x="2131665" y="5279382"/>
-            <a:ext cx="2938625" cy="923330"/>
-          </a:xfrm>
-          <a:prstGeom prst="rect">
-            <a:avLst/>
-          </a:prstGeom>
-          <a:noFill/>
-        </p:spPr>
-        <p:txBody>
-          <a:bodyPr wrap="none" rtlCol="0">
-            <a:spAutoFit/>
-          </a:bodyPr>
-          <a:lstStyle/>
-          <a:p>
-            <a:r>
-              <a:rPr lang="ko-KR" altLang="en-US" dirty="0"/>
-              <a:t>동시행위그룹</a:t>
-            </a:r>
-            <a:endParaRPr lang="en-US" altLang="ko-KR" dirty="0"/>
-          </a:p>
-          <a:p>
-            <a:endParaRPr lang="en-US" altLang="ko-KR" dirty="0"/>
-          </a:p>
-          <a:p>
-            <a:r>
-              <a:rPr lang="ko-KR" altLang="en-US" dirty="0"/>
-              <a:t>방법</a:t>
-            </a:r>
-            <a:r>
-              <a:rPr lang="en-US" altLang="ko-KR" dirty="0"/>
-              <a:t>: </a:t>
-            </a:r>
-            <a:r>
-              <a:rPr lang="ko-KR" altLang="en-US" dirty="0"/>
-              <a:t>무방향라인으로 연결</a:t>
-            </a:r>
-          </a:p>
-        </p:txBody>
-      </p:sp>
       <p:grpSp>
         <p:nvGrpSpPr>
-          <p:cNvPr id="85" name="그룹 84">
-            <a:extLst>
-              <a:ext uri="{FF2B5EF4-FFF2-40B4-BE49-F238E27FC236}">
-                <a16:creationId xmlns:a16="http://schemas.microsoft.com/office/drawing/2014/main" id="{2D890ED7-C516-89CA-9C90-1843AD20DD18}"/>
+          <p:cNvPr id="12" name="그룹 11">
+            <a:extLst>
+              <a:ext uri="{FF2B5EF4-FFF2-40B4-BE49-F238E27FC236}">
+                <a16:creationId xmlns:a16="http://schemas.microsoft.com/office/drawing/2014/main" id="{28F1E749-B7AF-5D5F-B20D-DFE5E966619C}"/>
               </a:ext>
             </a:extLst>
           </p:cNvPr>
@@ -9942,17 +9889,70 @@
         <p:grpSpPr>
           <a:xfrm>
             <a:off x="1393474" y="3016398"/>
-            <a:ext cx="4313815" cy="2743200"/>
+            <a:ext cx="4313815" cy="3186314"/>
             <a:chOff x="1393474" y="3016398"/>
-            <a:chExt cx="4313815" cy="2743200"/>
+            <a:chExt cx="4313815" cy="3186314"/>
           </a:xfrm>
         </p:grpSpPr>
+        <p:sp>
+          <p:nvSpPr>
+            <p:cNvPr id="57" name="TextBox 56">
+              <a:extLst>
+                <a:ext uri="{FF2B5EF4-FFF2-40B4-BE49-F238E27FC236}">
+                  <a16:creationId xmlns:a16="http://schemas.microsoft.com/office/drawing/2014/main" id="{86C0DB17-5983-5AB1-2A10-EF20E8B13F5C}"/>
+                </a:ext>
+              </a:extLst>
+            </p:cNvPr>
+            <p:cNvSpPr txBox="1"/>
+            <p:nvPr/>
+          </p:nvSpPr>
+          <p:spPr>
+            <a:xfrm>
+              <a:off x="2131665" y="5279382"/>
+              <a:ext cx="2938625" cy="923330"/>
+            </a:xfrm>
+            <a:prstGeom prst="rect">
+              <a:avLst/>
+            </a:prstGeom>
+            <a:noFill/>
+          </p:spPr>
+          <p:txBody>
+            <a:bodyPr wrap="none" rtlCol="0">
+              <a:spAutoFit/>
+            </a:bodyPr>
+            <a:lstStyle/>
+            <a:p>
+              <a:r>
+                <a:rPr lang="ko-KR" altLang="en-US" dirty="0"/>
+                <a:t>동시행위그룹</a:t>
+              </a:r>
+              <a:endParaRPr lang="en-US" altLang="ko-KR" dirty="0"/>
+            </a:p>
+            <a:p>
+              <a:endParaRPr lang="en-US" altLang="ko-KR" dirty="0"/>
+            </a:p>
+            <a:p>
+              <a:r>
+                <a:rPr lang="ko-KR" altLang="en-US" dirty="0"/>
+                <a:t>방법</a:t>
+              </a:r>
+              <a:r>
+                <a:rPr lang="en-US" altLang="ko-KR" dirty="0"/>
+                <a:t>: </a:t>
+              </a:r>
+              <a:r>
+                <a:rPr lang="ko-KR" altLang="en-US" dirty="0"/>
+                <a:t>무방향라인으로 연결</a:t>
+              </a:r>
+            </a:p>
+          </p:txBody>
+        </p:sp>
         <p:grpSp>
           <p:nvGrpSpPr>
-            <p:cNvPr id="6" name="그룹 5">
+            <p:cNvPr id="85" name="그룹 84">
               <a:extLst>
                 <a:ext uri="{FF2B5EF4-FFF2-40B4-BE49-F238E27FC236}">
-                  <a16:creationId xmlns:a16="http://schemas.microsoft.com/office/drawing/2014/main" id="{38FAFB92-6594-BE15-75B9-9A824E260EB2}"/>
+                  <a16:creationId xmlns:a16="http://schemas.microsoft.com/office/drawing/2014/main" id="{2D890ED7-C516-89CA-9C90-1843AD20DD18}"/>
                 </a:ext>
               </a:extLst>
             </p:cNvPr>
@@ -9963,16 +9963,16 @@
             <a:xfrm>
               <a:off x="1393474" y="3016398"/>
               <a:ext cx="4313815" cy="2743200"/>
-              <a:chOff x="1291312" y="2500236"/>
-              <a:chExt cx="9336108" cy="3590925"/>
+              <a:chOff x="1393474" y="3016398"/>
+              <a:chExt cx="4313815" cy="2743200"/>
             </a:xfrm>
           </p:grpSpPr>
           <p:grpSp>
             <p:nvGrpSpPr>
-              <p:cNvPr id="13" name="그룹 12">
+              <p:cNvPr id="6" name="그룹 5">
                 <a:extLst>
                   <a:ext uri="{FF2B5EF4-FFF2-40B4-BE49-F238E27FC236}">
-                    <a16:creationId xmlns:a16="http://schemas.microsoft.com/office/drawing/2014/main" id="{68273779-0907-B61E-CB28-7C3235EA2C81}"/>
+                    <a16:creationId xmlns:a16="http://schemas.microsoft.com/office/drawing/2014/main" id="{38FAFB92-6594-BE15-75B9-9A824E260EB2}"/>
                   </a:ext>
                 </a:extLst>
               </p:cNvPr>
@@ -9981,82 +9981,18 @@
             </p:nvGrpSpPr>
             <p:grpSpPr>
               <a:xfrm>
-                <a:off x="1291312" y="2500236"/>
-                <a:ext cx="9336108" cy="3590925"/>
+                <a:off x="1393474" y="3016398"/>
+                <a:ext cx="4313815" cy="2743200"/>
                 <a:chOff x="1291312" y="2500236"/>
                 <a:chExt cx="9336108" cy="3590925"/>
               </a:xfrm>
             </p:grpSpPr>
-            <p:sp>
-              <p:nvSpPr>
-                <p:cNvPr id="29" name="직사각형 28">
+            <p:grpSp>
+              <p:nvGrpSpPr>
+                <p:cNvPr id="13" name="그룹 12">
                   <a:extLst>
                     <a:ext uri="{FF2B5EF4-FFF2-40B4-BE49-F238E27FC236}">
-                      <a16:creationId xmlns:a16="http://schemas.microsoft.com/office/drawing/2014/main" id="{42C05E87-EB35-E538-CC97-7625C2644ADD}"/>
-                    </a:ext>
-                  </a:extLst>
-                </p:cNvPr>
-                <p:cNvSpPr/>
-                <p:nvPr/>
-              </p:nvSpPr>
-              <p:spPr>
-                <a:xfrm>
-                  <a:off x="1291312" y="2500236"/>
-                  <a:ext cx="9336108" cy="3590925"/>
-                </a:xfrm>
-                <a:prstGeom prst="rect">
-                  <a:avLst/>
-                </a:prstGeom>
-                <a:noFill/>
-                <a:ln>
-                  <a:solidFill>
-                    <a:schemeClr val="accent1"/>
-                  </a:solidFill>
-                </a:ln>
-              </p:spPr>
-              <p:style>
-                <a:lnRef idx="2">
-                  <a:schemeClr val="accent1">
-                    <a:shade val="50000"/>
-                  </a:schemeClr>
-                </a:lnRef>
-                <a:fillRef idx="1">
-                  <a:schemeClr val="accent1"/>
-                </a:fillRef>
-                <a:effectRef idx="0">
-                  <a:schemeClr val="accent1"/>
-                </a:effectRef>
-                <a:fontRef idx="minor">
-                  <a:schemeClr val="lt1"/>
-                </a:fontRef>
-              </p:style>
-              <p:txBody>
-                <a:bodyPr rtlCol="0" anchor="t"/>
-                <a:lstStyle/>
-                <a:p>
-                  <a:pPr algn="ctr"/>
-                  <a:r>
-                    <a:rPr lang="en-US" altLang="ko-KR" sz="1100" dirty="0">
-                      <a:solidFill>
-                        <a:schemeClr val="tx1"/>
-                      </a:solidFill>
-                    </a:rPr>
-                    <a:t>R1</a:t>
-                  </a:r>
-                  <a:endParaRPr lang="ko-KR" altLang="en-US" sz="600" dirty="0">
-                    <a:solidFill>
-                      <a:schemeClr val="tx1"/>
-                    </a:solidFill>
-                  </a:endParaRPr>
-                </a:p>
-              </p:txBody>
-            </p:sp>
-            <p:grpSp>
-              <p:nvGrpSpPr>
-                <p:cNvPr id="31" name="그룹 30">
-                  <a:extLst>
-                    <a:ext uri="{FF2B5EF4-FFF2-40B4-BE49-F238E27FC236}">
-                      <a16:creationId xmlns:a16="http://schemas.microsoft.com/office/drawing/2014/main" id="{BADDBE08-ABD4-230C-B560-729A8A147A38}"/>
+                      <a16:creationId xmlns:a16="http://schemas.microsoft.com/office/drawing/2014/main" id="{68273779-0907-B61E-CB28-7C3235EA2C81}"/>
                     </a:ext>
                   </a:extLst>
                 </p:cNvPr>
@@ -10065,18 +10001,18 @@
               </p:nvGrpSpPr>
               <p:grpSpPr>
                 <a:xfrm>
-                  <a:off x="2319279" y="2903389"/>
-                  <a:ext cx="2777936" cy="2011178"/>
-                  <a:chOff x="2319279" y="2903389"/>
-                  <a:chExt cx="2777936" cy="2011178"/>
+                  <a:off x="1291312" y="2500236"/>
+                  <a:ext cx="9336108" cy="3590925"/>
+                  <a:chOff x="1291312" y="2500236"/>
+                  <a:chExt cx="9336108" cy="3590925"/>
                 </a:xfrm>
               </p:grpSpPr>
               <p:sp>
                 <p:nvSpPr>
-                  <p:cNvPr id="36" name="타원 35">
+                  <p:cNvPr id="29" name="직사각형 28">
                     <a:extLst>
                       <a:ext uri="{FF2B5EF4-FFF2-40B4-BE49-F238E27FC236}">
-                        <a16:creationId xmlns:a16="http://schemas.microsoft.com/office/drawing/2014/main" id="{754D0C0D-93B9-1942-CAD1-61DF85B607AC}"/>
+                        <a16:creationId xmlns:a16="http://schemas.microsoft.com/office/drawing/2014/main" id="{42C05E87-EB35-E538-CC97-7625C2644ADD}"/>
                       </a:ext>
                     </a:extLst>
                   </p:cNvPr>
@@ -10085,12 +10021,13 @@
                 </p:nvSpPr>
                 <p:spPr>
                   <a:xfrm>
-                    <a:off x="2527565" y="4075368"/>
-                    <a:ext cx="2424718" cy="839199"/>
+                    <a:off x="1291312" y="2500236"/>
+                    <a:ext cx="9336108" cy="3590925"/>
                   </a:xfrm>
-                  <a:prstGeom prst="ellipse">
+                  <a:prstGeom prst="rect">
                     <a:avLst/>
                   </a:prstGeom>
+                  <a:noFill/>
                   <a:ln>
                     <a:solidFill>
                       <a:schemeClr val="accent1"/>
@@ -10114,174 +10051,399 @@
                   </a:fontRef>
                 </p:style>
                 <p:txBody>
-                  <a:bodyPr rtlCol="0" anchor="ctr"/>
+                  <a:bodyPr rtlCol="0" anchor="t"/>
                   <a:lstStyle/>
                   <a:p>
                     <a:pPr algn="ctr"/>
                     <a:r>
-                      <a:rPr lang="en-US" altLang="ko-KR" sz="1000" dirty="0"/>
-                      <a:t>SysB</a:t>
+                      <a:rPr lang="en-US" altLang="ko-KR" sz="1100" dirty="0">
+                        <a:solidFill>
+                          <a:schemeClr val="tx1"/>
+                        </a:solidFill>
+                      </a:rPr>
+                      <a:t>R1</a:t>
                     </a:r>
-                  </a:p>
-                  <a:p>
-                    <a:pPr algn="ctr"/>
-                    <a:r>
-                      <a:rPr lang="en-US" altLang="ko-KR" sz="1000" dirty="0"/>
-                      <a:t>.Func2</a:t>
-                    </a:r>
-                    <a:endParaRPr lang="ko-KR" altLang="en-US" sz="1000" dirty="0"/>
+                    <a:endParaRPr lang="ko-KR" altLang="en-US" sz="600" dirty="0">
+                      <a:solidFill>
+                        <a:schemeClr val="tx1"/>
+                      </a:solidFill>
+                    </a:endParaRPr>
                   </a:p>
                 </p:txBody>
               </p:sp>
-              <p:sp>
-                <p:nvSpPr>
-                  <p:cNvPr id="37" name="타원 36">
+              <p:grpSp>
+                <p:nvGrpSpPr>
+                  <p:cNvPr id="31" name="그룹 30">
                     <a:extLst>
                       <a:ext uri="{FF2B5EF4-FFF2-40B4-BE49-F238E27FC236}">
-                        <a16:creationId xmlns:a16="http://schemas.microsoft.com/office/drawing/2014/main" id="{3D11B9FE-E621-4D6E-3D63-CDAC8934FEEF}"/>
+                        <a16:creationId xmlns:a16="http://schemas.microsoft.com/office/drawing/2014/main" id="{BADDBE08-ABD4-230C-B560-729A8A147A38}"/>
                       </a:ext>
                     </a:extLst>
                   </p:cNvPr>
-                  <p:cNvSpPr/>
+                  <p:cNvGrpSpPr/>
                   <p:nvPr/>
-                </p:nvSpPr>
-                <p:spPr>
+                </p:nvGrpSpPr>
+                <p:grpSpPr>
                   <a:xfrm>
                     <a:off x="2319279" y="2903389"/>
-                    <a:ext cx="2777936" cy="798818"/>
+                    <a:ext cx="7145966" cy="2098587"/>
+                    <a:chOff x="2319279" y="2903389"/>
+                    <a:chExt cx="7145966" cy="2098587"/>
                   </a:xfrm>
-                  <a:prstGeom prst="ellipse">
-                    <a:avLst/>
-                  </a:prstGeom>
-                  <a:ln>
-                    <a:solidFill>
+                </p:grpSpPr>
+                <p:sp>
+                  <p:nvSpPr>
+                    <p:cNvPr id="36" name="타원 35">
+                      <a:extLst>
+                        <a:ext uri="{FF2B5EF4-FFF2-40B4-BE49-F238E27FC236}">
+                          <a16:creationId xmlns:a16="http://schemas.microsoft.com/office/drawing/2014/main" id="{754D0C0D-93B9-1942-CAD1-61DF85B607AC}"/>
+                        </a:ext>
+                      </a:extLst>
+                    </p:cNvPr>
+                    <p:cNvSpPr/>
+                    <p:nvPr/>
+                  </p:nvSpPr>
+                  <p:spPr>
+                    <a:xfrm>
+                      <a:off x="2527565" y="4075368"/>
+                      <a:ext cx="2424718" cy="839199"/>
+                    </a:xfrm>
+                    <a:prstGeom prst="ellipse">
+                      <a:avLst/>
+                    </a:prstGeom>
+                    <a:ln>
+                      <a:solidFill>
+                        <a:schemeClr val="accent1"/>
+                      </a:solidFill>
+                    </a:ln>
+                  </p:spPr>
+                  <p:style>
+                    <a:lnRef idx="2">
+                      <a:schemeClr val="accent1">
+                        <a:shade val="50000"/>
+                      </a:schemeClr>
+                    </a:lnRef>
+                    <a:fillRef idx="1">
                       <a:schemeClr val="accent1"/>
-                    </a:solidFill>
-                  </a:ln>
-                </p:spPr>
-                <p:style>
-                  <a:lnRef idx="2">
-                    <a:schemeClr val="accent1">
-                      <a:shade val="50000"/>
-                    </a:schemeClr>
-                  </a:lnRef>
-                  <a:fillRef idx="1">
-                    <a:schemeClr val="accent1"/>
-                  </a:fillRef>
-                  <a:effectRef idx="0">
-                    <a:schemeClr val="accent1"/>
-                  </a:effectRef>
-                  <a:fontRef idx="minor">
-                    <a:schemeClr val="lt1"/>
-                  </a:fontRef>
-                </p:style>
-                <p:txBody>
-                  <a:bodyPr rtlCol="0" anchor="ctr"/>
-                  <a:lstStyle/>
-                  <a:p>
-                    <a:pPr algn="ctr"/>
-                    <a:r>
-                      <a:rPr lang="en-US" altLang="ko-KR" sz="900" dirty="0"/>
-                      <a:t>SysB</a:t>
-                    </a:r>
-                  </a:p>
-                  <a:p>
-                    <a:pPr algn="ctr"/>
-                    <a:r>
-                      <a:rPr lang="en-US" altLang="ko-KR" sz="900" dirty="0"/>
-                      <a:t>.Func1</a:t>
-                    </a:r>
-                    <a:endParaRPr lang="ko-KR" altLang="en-US" sz="900" dirty="0"/>
-                  </a:p>
-                </p:txBody>
-              </p:sp>
+                    </a:fillRef>
+                    <a:effectRef idx="0">
+                      <a:schemeClr val="accent1"/>
+                    </a:effectRef>
+                    <a:fontRef idx="minor">
+                      <a:schemeClr val="lt1"/>
+                    </a:fontRef>
+                  </p:style>
+                  <p:txBody>
+                    <a:bodyPr rtlCol="0" anchor="ctr"/>
+                    <a:lstStyle/>
+                    <a:p>
+                      <a:pPr algn="ctr"/>
+                      <a:r>
+                        <a:rPr lang="en-US" altLang="ko-KR" sz="1000" dirty="0"/>
+                        <a:t>SysB</a:t>
+                      </a:r>
+                    </a:p>
+                    <a:p>
+                      <a:pPr algn="ctr"/>
+                      <a:r>
+                        <a:rPr lang="en-US" altLang="ko-KR" sz="1000" dirty="0"/>
+                        <a:t>.Func2</a:t>
+                      </a:r>
+                      <a:endParaRPr lang="ko-KR" altLang="en-US" sz="1000" dirty="0"/>
+                    </a:p>
+                  </p:txBody>
+                </p:sp>
+                <p:sp>
+                  <p:nvSpPr>
+                    <p:cNvPr id="37" name="타원 36">
+                      <a:extLst>
+                        <a:ext uri="{FF2B5EF4-FFF2-40B4-BE49-F238E27FC236}">
+                          <a16:creationId xmlns:a16="http://schemas.microsoft.com/office/drawing/2014/main" id="{3D11B9FE-E621-4D6E-3D63-CDAC8934FEEF}"/>
+                        </a:ext>
+                      </a:extLst>
+                    </p:cNvPr>
+                    <p:cNvSpPr/>
+                    <p:nvPr/>
+                  </p:nvSpPr>
+                  <p:spPr>
+                    <a:xfrm>
+                      <a:off x="2319279" y="2903389"/>
+                      <a:ext cx="2777936" cy="798818"/>
+                    </a:xfrm>
+                    <a:prstGeom prst="ellipse">
+                      <a:avLst/>
+                    </a:prstGeom>
+                    <a:ln>
+                      <a:solidFill>
+                        <a:schemeClr val="accent1"/>
+                      </a:solidFill>
+                    </a:ln>
+                  </p:spPr>
+                  <p:style>
+                    <a:lnRef idx="2">
+                      <a:schemeClr val="accent1">
+                        <a:shade val="50000"/>
+                      </a:schemeClr>
+                    </a:lnRef>
+                    <a:fillRef idx="1">
+                      <a:schemeClr val="accent1"/>
+                    </a:fillRef>
+                    <a:effectRef idx="0">
+                      <a:schemeClr val="accent1"/>
+                    </a:effectRef>
+                    <a:fontRef idx="minor">
+                      <a:schemeClr val="lt1"/>
+                    </a:fontRef>
+                  </p:style>
+                  <p:txBody>
+                    <a:bodyPr rtlCol="0" anchor="ctr"/>
+                    <a:lstStyle/>
+                    <a:p>
+                      <a:pPr algn="ctr"/>
+                      <a:r>
+                        <a:rPr lang="en-US" altLang="ko-KR" sz="900" dirty="0"/>
+                        <a:t>SysB</a:t>
+                      </a:r>
+                    </a:p>
+                    <a:p>
+                      <a:pPr algn="ctr"/>
+                      <a:r>
+                        <a:rPr lang="en-US" altLang="ko-KR" sz="900" dirty="0"/>
+                        <a:t>.Func1</a:t>
+                      </a:r>
+                      <a:endParaRPr lang="ko-KR" altLang="en-US" sz="900" dirty="0"/>
+                    </a:p>
+                  </p:txBody>
+                </p:sp>
+                <p:sp>
+                  <p:nvSpPr>
+                    <p:cNvPr id="7" name="타원 6">
+                      <a:extLst>
+                        <a:ext uri="{FF2B5EF4-FFF2-40B4-BE49-F238E27FC236}">
+                          <a16:creationId xmlns:a16="http://schemas.microsoft.com/office/drawing/2014/main" id="{6C9C7DED-2AAA-3CE9-E3D6-74EE5BBF72C8}"/>
+                        </a:ext>
+                      </a:extLst>
+                    </p:cNvPr>
+                    <p:cNvSpPr/>
+                    <p:nvPr/>
+                  </p:nvSpPr>
+                  <p:spPr>
+                    <a:xfrm>
+                      <a:off x="7040527" y="4162777"/>
+                      <a:ext cx="2424718" cy="839199"/>
+                    </a:xfrm>
+                    <a:prstGeom prst="ellipse">
+                      <a:avLst/>
+                    </a:prstGeom>
+                    <a:ln>
+                      <a:solidFill>
+                        <a:schemeClr val="accent1"/>
+                      </a:solidFill>
+                    </a:ln>
+                  </p:spPr>
+                  <p:style>
+                    <a:lnRef idx="2">
+                      <a:schemeClr val="accent1">
+                        <a:shade val="50000"/>
+                      </a:schemeClr>
+                    </a:lnRef>
+                    <a:fillRef idx="1">
+                      <a:schemeClr val="accent1"/>
+                    </a:fillRef>
+                    <a:effectRef idx="0">
+                      <a:schemeClr val="accent1"/>
+                    </a:effectRef>
+                    <a:fontRef idx="minor">
+                      <a:schemeClr val="lt1"/>
+                    </a:fontRef>
+                  </p:style>
+                  <p:txBody>
+                    <a:bodyPr rtlCol="0" anchor="ctr"/>
+                    <a:lstStyle/>
+                    <a:p>
+                      <a:pPr algn="ctr"/>
+                      <a:r>
+                        <a:rPr lang="en-US" altLang="ko-KR" sz="1000" dirty="0"/>
+                        <a:t>SysB</a:t>
+                      </a:r>
+                    </a:p>
+                    <a:p>
+                      <a:pPr algn="ctr"/>
+                      <a:r>
+                        <a:rPr lang="en-US" altLang="ko-KR" sz="1000" dirty="0"/>
+                        <a:t>.Func2</a:t>
+                      </a:r>
+                      <a:endParaRPr lang="ko-KR" altLang="en-US" sz="1000" dirty="0"/>
+                    </a:p>
+                  </p:txBody>
+                </p:sp>
+              </p:grpSp>
             </p:grpSp>
+            <p:sp>
+              <p:nvSpPr>
+                <p:cNvPr id="23" name="타원 22">
+                  <a:extLst>
+                    <a:ext uri="{FF2B5EF4-FFF2-40B4-BE49-F238E27FC236}">
+                      <a16:creationId xmlns:a16="http://schemas.microsoft.com/office/drawing/2014/main" id="{2A59823F-60D6-767B-7621-A1E673C5E6F1}"/>
+                    </a:ext>
+                  </a:extLst>
+                </p:cNvPr>
+                <p:cNvSpPr/>
+                <p:nvPr/>
+              </p:nvSpPr>
+              <p:spPr>
+                <a:xfrm>
+                  <a:off x="7040526" y="2883199"/>
+                  <a:ext cx="2424718" cy="839199"/>
+                </a:xfrm>
+                <a:prstGeom prst="ellipse">
+                  <a:avLst/>
+                </a:prstGeom>
+              </p:spPr>
+              <p:style>
+                <a:lnRef idx="2">
+                  <a:schemeClr val="accent1">
+                    <a:shade val="50000"/>
+                  </a:schemeClr>
+                </a:lnRef>
+                <a:fillRef idx="1">
+                  <a:schemeClr val="accent1"/>
+                </a:fillRef>
+                <a:effectRef idx="0">
+                  <a:schemeClr val="accent1"/>
+                </a:effectRef>
+                <a:fontRef idx="minor">
+                  <a:schemeClr val="lt1"/>
+                </a:fontRef>
+              </p:style>
+              <p:txBody>
+                <a:bodyPr rtlCol="0" anchor="ctr"/>
+                <a:lstStyle/>
+                <a:p>
+                  <a:pPr algn="ctr"/>
+                  <a:r>
+                    <a:rPr lang="en-US" altLang="ko-KR" sz="1000" dirty="0"/>
+                    <a:t>SysB</a:t>
+                  </a:r>
+                </a:p>
+                <a:p>
+                  <a:pPr algn="ctr"/>
+                  <a:r>
+                    <a:rPr lang="en-US" altLang="ko-KR" sz="1000" dirty="0"/>
+                    <a:t>.Func1</a:t>
+                  </a:r>
+                  <a:endParaRPr lang="ko-KR" altLang="en-US" sz="1000" dirty="0"/>
+                </a:p>
+              </p:txBody>
+            </p:sp>
           </p:grpSp>
-          <p:sp>
-            <p:nvSpPr>
-              <p:cNvPr id="23" name="타원 22">
+          <p:cxnSp>
+            <p:nvCxnSpPr>
+              <p:cNvPr id="84" name="직선 화살표 연결선 83">
                 <a:extLst>
                   <a:ext uri="{FF2B5EF4-FFF2-40B4-BE49-F238E27FC236}">
-                    <a16:creationId xmlns:a16="http://schemas.microsoft.com/office/drawing/2014/main" id="{2A59823F-60D6-767B-7621-A1E673C5E6F1}"/>
+                    <a16:creationId xmlns:a16="http://schemas.microsoft.com/office/drawing/2014/main" id="{708FC434-C24E-8760-3603-8866FDA68F02}"/>
                   </a:ext>
                 </a:extLst>
               </p:cNvPr>
-              <p:cNvSpPr/>
+              <p:cNvCxnSpPr>
+                <a:cxnSpLocks/>
+                <a:stCxn id="37" idx="6"/>
+                <a:endCxn id="23" idx="2"/>
+              </p:cNvCxnSpPr>
               <p:nvPr/>
-            </p:nvSpPr>
+            </p:nvCxnSpPr>
             <p:spPr>
               <a:xfrm>
-                <a:off x="7040526" y="2883199"/>
-                <a:ext cx="2424718" cy="839199"/>
+                <a:off x="3152018" y="3629496"/>
+                <a:ext cx="897921" cy="0"/>
               </a:xfrm>
-              <a:prstGeom prst="ellipse">
+              <a:prstGeom prst="straightConnector1">
                 <a:avLst/>
               </a:prstGeom>
+              <a:ln>
+                <a:tailEnd type="triangle"/>
+              </a:ln>
             </p:spPr>
             <p:style>
-              <a:lnRef idx="2">
-                <a:schemeClr val="accent1">
-                  <a:shade val="50000"/>
-                </a:schemeClr>
+              <a:lnRef idx="1">
+                <a:schemeClr val="accent1"/>
               </a:lnRef>
-              <a:fillRef idx="1">
+              <a:fillRef idx="0">
                 <a:schemeClr val="accent1"/>
               </a:fillRef>
               <a:effectRef idx="0">
                 <a:schemeClr val="accent1"/>
               </a:effectRef>
               <a:fontRef idx="minor">
-                <a:schemeClr val="lt1"/>
+                <a:schemeClr val="tx1"/>
               </a:fontRef>
             </p:style>
-            <p:txBody>
-              <a:bodyPr rtlCol="0" anchor="ctr"/>
-              <a:lstStyle/>
-              <a:p>
-                <a:pPr algn="ctr"/>
-                <a:r>
-                  <a:rPr lang="en-US" altLang="ko-KR" sz="1000" dirty="0"/>
-                  <a:t>SysB</a:t>
-                </a:r>
-              </a:p>
-              <a:p>
-                <a:pPr algn="ctr"/>
-                <a:r>
-                  <a:rPr lang="en-US" altLang="ko-KR" sz="1000" dirty="0"/>
-                  <a:t>.Func1</a:t>
-                </a:r>
-                <a:endParaRPr lang="ko-KR" altLang="en-US" sz="1000" dirty="0"/>
-              </a:p>
-            </p:txBody>
-          </p:sp>
+          </p:cxnSp>
         </p:grpSp>
         <p:cxnSp>
           <p:nvCxnSpPr>
-            <p:cNvPr id="84" name="직선 화살표 연결선 83">
+            <p:cNvPr id="5" name="직선 연결선 4">
               <a:extLst>
                 <a:ext uri="{FF2B5EF4-FFF2-40B4-BE49-F238E27FC236}">
-                  <a16:creationId xmlns:a16="http://schemas.microsoft.com/office/drawing/2014/main" id="{708FC434-C24E-8760-3603-8866FDA68F02}"/>
+                  <a16:creationId xmlns:a16="http://schemas.microsoft.com/office/drawing/2014/main" id="{B2903C9A-7E9D-7B92-E96B-7F51C8E29520}"/>
+                </a:ext>
+              </a:extLst>
+            </p:cNvPr>
+            <p:cNvCxnSpPr>
+              <a:stCxn id="37" idx="4"/>
+              <a:endCxn id="36" idx="0"/>
+            </p:cNvCxnSpPr>
+            <p:nvPr/>
+          </p:nvCxnSpPr>
+          <p:spPr>
+            <a:xfrm>
+              <a:off x="2510236" y="3934615"/>
+              <a:ext cx="14636" cy="285067"/>
+            </a:xfrm>
+            <a:prstGeom prst="line">
+              <a:avLst/>
+            </a:prstGeom>
+          </p:spPr>
+          <p:style>
+            <a:lnRef idx="1">
+              <a:schemeClr val="accent1"/>
+            </a:lnRef>
+            <a:fillRef idx="0">
+              <a:schemeClr val="accent1"/>
+            </a:fillRef>
+            <a:effectRef idx="0">
+              <a:schemeClr val="accent1"/>
+            </a:effectRef>
+            <a:fontRef idx="minor">
+              <a:schemeClr val="tx1"/>
+            </a:fontRef>
+          </p:style>
+        </p:cxnSp>
+        <p:cxnSp>
+          <p:nvCxnSpPr>
+            <p:cNvPr id="8" name="직선 연결선 7">
+              <a:extLst>
+                <a:ext uri="{FF2B5EF4-FFF2-40B4-BE49-F238E27FC236}">
+                  <a16:creationId xmlns:a16="http://schemas.microsoft.com/office/drawing/2014/main" id="{203441F8-3A83-E33C-09A1-92C4A3952B0D}"/>
                 </a:ext>
               </a:extLst>
             </p:cNvPr>
             <p:cNvCxnSpPr>
               <a:cxnSpLocks/>
-              <a:stCxn id="37" idx="6"/>
-              <a:endCxn id="23" idx="2"/>
+              <a:stCxn id="23" idx="4"/>
+              <a:endCxn id="7" idx="0"/>
             </p:cNvCxnSpPr>
             <p:nvPr/>
           </p:nvCxnSpPr>
           <p:spPr>
             <a:xfrm>
-              <a:off x="3152018" y="3629496"/>
-              <a:ext cx="897921" cy="0"/>
+              <a:off x="4610118" y="3950039"/>
+              <a:ext cx="0" cy="336417"/>
             </a:xfrm>
-            <a:prstGeom prst="straightConnector1">
+            <a:prstGeom prst="line">
               <a:avLst/>
             </a:prstGeom>
-            <a:ln>
-              <a:tailEnd type="triangle"/>
-            </a:ln>
           </p:spPr>
           <p:style>
             <a:lnRef idx="1">
@@ -10299,45 +10461,6 @@
           </p:style>
         </p:cxnSp>
       </p:grpSp>
-      <p:cxnSp>
-        <p:nvCxnSpPr>
-          <p:cNvPr id="5" name="직선 연결선 4">
-            <a:extLst>
-              <a:ext uri="{FF2B5EF4-FFF2-40B4-BE49-F238E27FC236}">
-                <a16:creationId xmlns:a16="http://schemas.microsoft.com/office/drawing/2014/main" id="{B2903C9A-7E9D-7B92-E96B-7F51C8E29520}"/>
-              </a:ext>
-            </a:extLst>
-          </p:cNvPr>
-          <p:cNvCxnSpPr>
-            <a:stCxn id="37" idx="4"/>
-            <a:endCxn id="36" idx="0"/>
-          </p:cNvCxnSpPr>
-          <p:nvPr/>
-        </p:nvCxnSpPr>
-        <p:spPr>
-          <a:xfrm>
-            <a:off x="2510236" y="3934615"/>
-            <a:ext cx="14636" cy="285067"/>
-          </a:xfrm>
-          <a:prstGeom prst="line">
-            <a:avLst/>
-          </a:prstGeom>
-        </p:spPr>
-        <p:style>
-          <a:lnRef idx="1">
-            <a:schemeClr val="accent1"/>
-          </a:lnRef>
-          <a:fillRef idx="0">
-            <a:schemeClr val="accent1"/>
-          </a:fillRef>
-          <a:effectRef idx="0">
-            <a:schemeClr val="accent1"/>
-          </a:effectRef>
-          <a:fontRef idx="minor">
-            <a:schemeClr val="tx1"/>
-          </a:fontRef>
-        </p:style>
-      </p:cxnSp>
     </p:spTree>
     <p:extLst>
       <p:ext uri="{BB962C8B-B14F-4D97-AF65-F5344CB8AC3E}">

</xml_diff>